<commit_message>
chagned sprint 2 eval doc
</commit_message>
<xml_diff>
--- a/documents/Sprint 2 Report.pptx
+++ b/documents/Sprint 2 Report.pptx
@@ -10730,13 +10730,13 @@
   <p:clrMapOvr>
     <a:masterClrMapping/>
   </p:clrMapOvr>
-  <mc:AlternateContent xmlns:mc="http://schemas.openxmlformats.org/markup-compatibility/2006">
-    <mc:Choice xmlns:p15="http://schemas.microsoft.com/office/powerpoint/2012/main" Requires="p15">
+  <mc:AlternateContent xmlns:mc="http://schemas.openxmlformats.org/markup-compatibility/2006" xmlns:p15="http://schemas.microsoft.com/office/powerpoint/2012/main">
+    <mc:Choice Requires="p15">
       <p:transition xmlns:p14="http://schemas.microsoft.com/office/powerpoint/2010/main" spd="slow" p14:dur="1250">
         <p15:prstTrans prst="peelOff"/>
       </p:transition>
     </mc:Choice>
-    <mc:Fallback>
+    <mc:Fallback xmlns="">
       <p:transition spd="slow">
         <p:fade/>
       </p:transition>
@@ -10898,13 +10898,13 @@
   <p:clrMapOvr>
     <a:masterClrMapping/>
   </p:clrMapOvr>
-  <mc:AlternateContent xmlns:mc="http://schemas.openxmlformats.org/markup-compatibility/2006">
-    <mc:Choice xmlns:p15="http://schemas.microsoft.com/office/powerpoint/2012/main" Requires="p15">
+  <mc:AlternateContent xmlns:mc="http://schemas.openxmlformats.org/markup-compatibility/2006" xmlns:p15="http://schemas.microsoft.com/office/powerpoint/2012/main">
+    <mc:Choice Requires="p15">
       <p:transition xmlns:p14="http://schemas.microsoft.com/office/powerpoint/2010/main" spd="slow" p14:dur="2000">
         <p15:prstTrans prst="wind"/>
       </p:transition>
     </mc:Choice>
-    <mc:Fallback>
+    <mc:Fallback xmlns="">
       <p:transition spd="slow">
         <p:fade/>
       </p:transition>
@@ -11012,6 +11012,17 @@
             </a:r>
           </a:p>
           <a:p>
+            <a:r>
+              <a:rPr lang="en-US" sz="1600" dirty="0"/>
+              <a:t>Convention of testing, and naming conventions should be consistently stated </a:t>
+            </a:r>
+            <a:r>
+              <a:rPr lang="en-US" sz="1600"/>
+              <a:t>before sprint begins.</a:t>
+            </a:r>
+            <a:endParaRPr lang="en-US" sz="1600" dirty="0"/>
+          </a:p>
+          <a:p>
             <a:endParaRPr lang="en-GB" sz="1600" dirty="0"/>
           </a:p>
         </p:txBody>
@@ -11026,13 +11037,13 @@
   <p:clrMapOvr>
     <a:masterClrMapping/>
   </p:clrMapOvr>
-  <mc:AlternateContent xmlns:mc="http://schemas.openxmlformats.org/markup-compatibility/2006">
-    <mc:Choice xmlns:p15="http://schemas.microsoft.com/office/powerpoint/2012/main" Requires="p15">
+  <mc:AlternateContent xmlns:mc="http://schemas.openxmlformats.org/markup-compatibility/2006" xmlns:p15="http://schemas.microsoft.com/office/powerpoint/2012/main">
+    <mc:Choice Requires="p15">
       <p:transition xmlns:p14="http://schemas.microsoft.com/office/powerpoint/2010/main" spd="slow" p14:dur="3250">
         <p15:prstTrans prst="origami"/>
       </p:transition>
     </mc:Choice>
-    <mc:Fallback>
+    <mc:Fallback xmlns="">
       <p:transition spd="slow">
         <p:fade/>
       </p:transition>

</xml_diff>